<commit_message>
Requirements angepasst, Risiken, ReleasePlanung, Aufwandsplanung
</commit_message>
<xml_diff>
--- a/50_Risiken/Risiken.pptx
+++ b/50_Risiken/Risiken.pptx
@@ -104,6 +104,11 @@
       </a:defRPr>
     </a:lvl9pPr>
   </p:defaultTextStyle>
+  <p:extLst>
+    <p:ext uri="{EFAFB233-063F-42B5-8137-9DF3F51BA10A}">
+      <p15:sldGuideLst xmlns:p15="http://schemas.microsoft.com/office/powerpoint/2012/main"/>
+    </p:ext>
+  </p:extLst>
 </p:presentation>
 </file>
 
@@ -120,12 +125,12 @@
   <pc:docChgLst>
     <pc:chgData name="Wolf, Jonas" userId="ce93576c-8126-48e2-b1b2-02aeec5bfe13" providerId="ADAL" clId="{378BCED4-BA18-4AB0-BC98-B6B0EC673E79}"/>
     <pc:docChg chg="modSld">
-      <pc:chgData name="Wolf, Jonas" userId="ce93576c-8126-48e2-b1b2-02aeec5bfe13" providerId="ADAL" clId="{378BCED4-BA18-4AB0-BC98-B6B0EC673E79}" dt="2019-10-28T16:29:54.058" v="59" actId="20577"/>
+      <pc:chgData name="Wolf, Jonas" userId="ce93576c-8126-48e2-b1b2-02aeec5bfe13" providerId="ADAL" clId="{378BCED4-BA18-4AB0-BC98-B6B0EC673E79}" dt="2019-10-28T23:47:52.294" v="104" actId="20577"/>
       <pc:docMkLst>
         <pc:docMk/>
       </pc:docMkLst>
       <pc:sldChg chg="addSp modSp">
-        <pc:chgData name="Wolf, Jonas" userId="ce93576c-8126-48e2-b1b2-02aeec5bfe13" providerId="ADAL" clId="{378BCED4-BA18-4AB0-BC98-B6B0EC673E79}" dt="2019-10-28T16:29:54.058" v="59" actId="20577"/>
+        <pc:chgData name="Wolf, Jonas" userId="ce93576c-8126-48e2-b1b2-02aeec5bfe13" providerId="ADAL" clId="{378BCED4-BA18-4AB0-BC98-B6B0EC673E79}" dt="2019-10-28T23:47:52.294" v="104" actId="20577"/>
         <pc:sldMkLst>
           <pc:docMk/>
           <pc:sldMk cId="1920868767" sldId="256"/>
@@ -146,6 +151,14 @@
             <ac:spMk id="11" creationId="{4DF37947-83BE-4E7F-B1B5-ED1706113A6F}"/>
           </ac:spMkLst>
         </pc:spChg>
+        <pc:graphicFrameChg chg="modGraphic">
+          <ac:chgData name="Wolf, Jonas" userId="ce93576c-8126-48e2-b1b2-02aeec5bfe13" providerId="ADAL" clId="{378BCED4-BA18-4AB0-BC98-B6B0EC673E79}" dt="2019-10-28T23:47:52.294" v="104" actId="20577"/>
+          <ac:graphicFrameMkLst>
+            <pc:docMk/>
+            <pc:sldMk cId="1920868767" sldId="256"/>
+            <ac:graphicFrameMk id="5" creationId="{6038AD0E-64DD-4F3F-A4D0-90F86D74EB9C}"/>
+          </ac:graphicFrameMkLst>
+        </pc:graphicFrameChg>
       </pc:sldChg>
     </pc:docChg>
   </pc:docChgLst>
@@ -3402,7 +3415,7 @@
           <p:nvPr>
             <p:extLst>
               <p:ext uri="{D42A27DB-BD31-4B8C-83A1-F6EECF244321}">
-                <p14:modId xmlns:p14="http://schemas.microsoft.com/office/powerpoint/2010/main" val="394020571"/>
+                <p14:modId xmlns:p14="http://schemas.microsoft.com/office/powerpoint/2010/main" val="1061995146"/>
               </p:ext>
             </p:extLst>
           </p:nvPr>
@@ -3529,11 +3542,14 @@
                     <a:lstStyle/>
                     <a:p>
                       <a:pPr algn="ctr"/>
-                      <a:endParaRPr lang="de-DE" dirty="0">
-                        <a:solidFill>
-                          <a:schemeClr val="tx1"/>
-                        </a:solidFill>
-                      </a:endParaRPr>
+                      <a:r>
+                        <a:rPr lang="de-DE" dirty="0">
+                          <a:solidFill>
+                            <a:schemeClr val="tx1"/>
+                          </a:solidFill>
+                        </a:rPr>
+                        <a:t>I1</a:t>
+                      </a:r>
                     </a:p>
                   </a:txBody>
                   <a:tcPr anchor="ctr">
@@ -3592,11 +3608,14 @@
                     <a:lstStyle/>
                     <a:p>
                       <a:pPr algn="ctr"/>
-                      <a:endParaRPr lang="de-DE" dirty="0">
-                        <a:solidFill>
-                          <a:schemeClr val="tx1"/>
-                        </a:solidFill>
-                      </a:endParaRPr>
+                      <a:r>
+                        <a:rPr lang="de-DE" dirty="0">
+                          <a:solidFill>
+                            <a:schemeClr val="tx1"/>
+                          </a:solidFill>
+                        </a:rPr>
+                        <a:t>C2</a:t>
+                      </a:r>
                     </a:p>
                   </a:txBody>
                   <a:tcPr anchor="ctr">
@@ -3990,11 +4009,14 @@
                     <a:lstStyle/>
                     <a:p>
                       <a:pPr algn="ctr"/>
-                      <a:endParaRPr lang="de-DE" dirty="0">
-                        <a:solidFill>
-                          <a:schemeClr val="tx1"/>
-                        </a:solidFill>
-                      </a:endParaRPr>
+                      <a:r>
+                        <a:rPr lang="de-DE" dirty="0">
+                          <a:solidFill>
+                            <a:schemeClr val="tx1"/>
+                          </a:solidFill>
+                        </a:rPr>
+                        <a:t>C3</a:t>
+                      </a:r>
                     </a:p>
                   </a:txBody>
                   <a:tcPr anchor="ctr">
@@ -4141,7 +4163,7 @@
                       </a:br>
                       <a:r>
                         <a:rPr lang="de-DE" sz="1800" dirty="0"/>
-                        <a:t>IT-Risiko</a:t>
+                        <a:t>IT-Risiko, I3, C1, K2</a:t>
                       </a:r>
                     </a:p>
                   </a:txBody>
@@ -4615,11 +4637,14 @@
                     <a:lstStyle/>
                     <a:p>
                       <a:pPr algn="ctr"/>
-                      <a:endParaRPr lang="de-DE" dirty="0">
-                        <a:solidFill>
-                          <a:schemeClr val="tx1"/>
-                        </a:solidFill>
-                      </a:endParaRPr>
+                      <a:r>
+                        <a:rPr lang="de-DE" dirty="0">
+                          <a:solidFill>
+                            <a:schemeClr val="tx1"/>
+                          </a:solidFill>
+                        </a:rPr>
+                        <a:t>FV1</a:t>
+                      </a:r>
                     </a:p>
                   </a:txBody>
                   <a:tcPr anchor="ctr">
@@ -4894,6 +4919,80 @@
                     <a:lstStyle/>
                     <a:p>
                       <a:pPr algn="ctr"/>
+                      <a:r>
+                        <a:rPr lang="de-DE" dirty="0">
+                          <a:solidFill>
+                            <a:schemeClr val="tx1"/>
+                          </a:solidFill>
+                        </a:rPr>
+                        <a:t>FF2, B1</a:t>
+                      </a:r>
+                    </a:p>
+                  </a:txBody>
+                  <a:tcPr anchor="ctr">
+                    <a:lnL w="12700" cap="flat" cmpd="sng" algn="ctr">
+                      <a:solidFill>
+                        <a:schemeClr val="tx1"/>
+                      </a:solidFill>
+                      <a:prstDash val="solid"/>
+                      <a:round/>
+                      <a:headEnd type="none" w="med" len="med"/>
+                      <a:tailEnd type="none" w="med" len="med"/>
+                    </a:lnL>
+                    <a:lnR w="12700" cap="flat" cmpd="sng" algn="ctr">
+                      <a:solidFill>
+                        <a:schemeClr val="tx1"/>
+                      </a:solidFill>
+                      <a:prstDash val="solid"/>
+                      <a:round/>
+                      <a:headEnd type="none" w="med" len="med"/>
+                      <a:tailEnd type="none" w="med" len="med"/>
+                    </a:lnR>
+                    <a:lnT w="12700" cap="flat" cmpd="sng" algn="ctr">
+                      <a:solidFill>
+                        <a:schemeClr val="tx1"/>
+                      </a:solidFill>
+                      <a:prstDash val="solid"/>
+                      <a:round/>
+                      <a:headEnd type="none" w="med" len="med"/>
+                      <a:tailEnd type="none" w="med" len="med"/>
+                    </a:lnT>
+                    <a:lnB w="12700" cap="flat" cmpd="sng" algn="ctr">
+                      <a:solidFill>
+                        <a:schemeClr val="tx1"/>
+                      </a:solidFill>
+                      <a:prstDash val="solid"/>
+                      <a:round/>
+                      <a:headEnd type="none" w="med" len="med"/>
+                      <a:tailEnd type="none" w="med" len="med"/>
+                    </a:lnB>
+                    <a:lnTlToBr w="12700" cmpd="sng">
+                      <a:noFill/>
+                      <a:prstDash val="solid"/>
+                    </a:lnTlToBr>
+                    <a:lnBlToTr w="12700" cmpd="sng">
+                      <a:noFill/>
+                      <a:prstDash val="solid"/>
+                    </a:lnBlToTr>
+                    <a:solidFill>
+                      <a:srgbClr val="FFFF00"/>
+                    </a:solidFill>
+                  </a:tcPr>
+                </a:tc>
+                <a:tc>
+                  <a:txBody>
+                    <a:bodyPr/>
+                    <a:lstStyle/>
+                    <a:p>
+                      <a:pPr algn="ctr"/>
+                      <a:r>
+                        <a:rPr lang="de-DE">
+                          <a:solidFill>
+                            <a:schemeClr val="tx1"/>
+                          </a:solidFill>
+                        </a:rPr>
+                        <a:t>I2, K1</a:t>
+                      </a:r>
                       <a:endParaRPr lang="de-DE" dirty="0">
                         <a:solidFill>
                           <a:schemeClr val="tx1"/>
@@ -4958,69 +5057,6 @@
                     <a:p>
                       <a:pPr algn="ctr"/>
                       <a:endParaRPr lang="de-DE" dirty="0">
-                        <a:solidFill>
-                          <a:schemeClr val="tx1"/>
-                        </a:solidFill>
-                      </a:endParaRPr>
-                    </a:p>
-                  </a:txBody>
-                  <a:tcPr anchor="ctr">
-                    <a:lnL w="12700" cap="flat" cmpd="sng" algn="ctr">
-                      <a:solidFill>
-                        <a:schemeClr val="tx1"/>
-                      </a:solidFill>
-                      <a:prstDash val="solid"/>
-                      <a:round/>
-                      <a:headEnd type="none" w="med" len="med"/>
-                      <a:tailEnd type="none" w="med" len="med"/>
-                    </a:lnL>
-                    <a:lnR w="12700" cap="flat" cmpd="sng" algn="ctr">
-                      <a:solidFill>
-                        <a:schemeClr val="tx1"/>
-                      </a:solidFill>
-                      <a:prstDash val="solid"/>
-                      <a:round/>
-                      <a:headEnd type="none" w="med" len="med"/>
-                      <a:tailEnd type="none" w="med" len="med"/>
-                    </a:lnR>
-                    <a:lnT w="12700" cap="flat" cmpd="sng" algn="ctr">
-                      <a:solidFill>
-                        <a:schemeClr val="tx1"/>
-                      </a:solidFill>
-                      <a:prstDash val="solid"/>
-                      <a:round/>
-                      <a:headEnd type="none" w="med" len="med"/>
-                      <a:tailEnd type="none" w="med" len="med"/>
-                    </a:lnT>
-                    <a:lnB w="12700" cap="flat" cmpd="sng" algn="ctr">
-                      <a:solidFill>
-                        <a:schemeClr val="tx1"/>
-                      </a:solidFill>
-                      <a:prstDash val="solid"/>
-                      <a:round/>
-                      <a:headEnd type="none" w="med" len="med"/>
-                      <a:tailEnd type="none" w="med" len="med"/>
-                    </a:lnB>
-                    <a:lnTlToBr w="12700" cmpd="sng">
-                      <a:noFill/>
-                      <a:prstDash val="solid"/>
-                    </a:lnTlToBr>
-                    <a:lnBlToTr w="12700" cmpd="sng">
-                      <a:noFill/>
-                      <a:prstDash val="solid"/>
-                    </a:lnBlToTr>
-                    <a:solidFill>
-                      <a:srgbClr val="FFFF00"/>
-                    </a:solidFill>
-                  </a:tcPr>
-                </a:tc>
-                <a:tc>
-                  <a:txBody>
-                    <a:bodyPr/>
-                    <a:lstStyle/>
-                    <a:p>
-                      <a:pPr algn="ctr"/>
-                      <a:endParaRPr lang="de-DE">
                         <a:solidFill>
                           <a:schemeClr val="tx1"/>
                         </a:solidFill>
@@ -5244,11 +5280,14 @@
                     <a:lstStyle/>
                     <a:p>
                       <a:pPr algn="ctr"/>
-                      <a:endParaRPr lang="de-DE" dirty="0">
-                        <a:solidFill>
-                          <a:schemeClr val="tx1"/>
-                        </a:solidFill>
-                      </a:endParaRPr>
+                      <a:r>
+                        <a:rPr lang="de-DE" dirty="0">
+                          <a:solidFill>
+                            <a:schemeClr val="tx1"/>
+                          </a:solidFill>
+                        </a:rPr>
+                        <a:t>FF1, B2</a:t>
+                      </a:r>
                     </a:p>
                   </a:txBody>
                   <a:tcPr anchor="ctr">
@@ -6400,6 +6439,21 @@
 </file>
 
 <file path=customXml/item1.xml><?xml version="1.0" encoding="utf-8"?>
+<p:properties xmlns:p="http://schemas.microsoft.com/office/2006/metadata/properties" xmlns:xsi="http://www.w3.org/2001/XMLSchema-instance" xmlns:pc="http://schemas.microsoft.com/office/infopath/2007/PartnerControls">
+  <documentManagement/>
+</p:properties>
+</file>
+
+<file path=customXml/item2.xml><?xml version="1.0" encoding="utf-8"?>
+<?mso-contentType ?>
+<FormTemplates xmlns="http://schemas.microsoft.com/sharepoint/v3/contenttype/forms">
+  <Display>DocumentLibraryForm</Display>
+  <Edit>DocumentLibraryForm</Edit>
+  <New>DocumentLibraryForm</New>
+</FormTemplates>
+</file>
+
+<file path=customXml/item3.xml><?xml version="1.0" encoding="utf-8"?>
 <ct:contentTypeSchema xmlns:ct="http://schemas.microsoft.com/office/2006/metadata/contentType" xmlns:ma="http://schemas.microsoft.com/office/2006/metadata/properties/metaAttributes" ct:_="" ma:_="" ma:contentTypeName="Document" ma:contentTypeID="0x010100302252FD5D3F394493BB302406A555D7" ma:contentTypeVersion="11" ma:contentTypeDescription="Create a new document." ma:contentTypeScope="" ma:versionID="28e715b3efdeb9ed1aee5761e0340d74">
   <xsd:schema xmlns:xsd="http://www.w3.org/2001/XMLSchema" xmlns:xs="http://www.w3.org/2001/XMLSchema" xmlns:p="http://schemas.microsoft.com/office/2006/metadata/properties" xmlns:ns3="272d7bb6-cd5b-4f33-8ae3-e8015fdb73fb" xmlns:ns4="2f5f16af-62c1-4477-bd62-b3bd53884ca4" targetNamespace="http://schemas.microsoft.com/office/2006/metadata/properties" ma:root="true" ma:fieldsID="c53460ba978c0a81f34278b4f8e7e339" ns3:_="" ns4:_="">
     <xsd:import namespace="272d7bb6-cd5b-4f33-8ae3-e8015fdb73fb"/>
@@ -6608,22 +6662,24 @@
 </ct:contentTypeSchema>
 </file>
 
-<file path=customXml/item2.xml><?xml version="1.0" encoding="utf-8"?>
-<?mso-contentType ?>
-<FormTemplates xmlns="http://schemas.microsoft.com/sharepoint/v3/contenttype/forms">
-  <Display>DocumentLibraryForm</Display>
-  <Edit>DocumentLibraryForm</Edit>
-  <New>DocumentLibraryForm</New>
-</FormTemplates>
+<file path=customXml/itemProps1.xml><?xml version="1.0" encoding="utf-8"?>
+<ds:datastoreItem xmlns:ds="http://schemas.openxmlformats.org/officeDocument/2006/customXml" ds:itemID="{D2B0D86C-7124-40CF-ACDD-DDA5B87CBC74}">
+  <ds:schemaRefs>
+    <ds:schemaRef ds:uri="http://schemas.microsoft.com/office/2006/metadata/properties"/>
+    <ds:schemaRef ds:uri="http://schemas.microsoft.com/office/infopath/2007/PartnerControls"/>
+  </ds:schemaRefs>
+</ds:datastoreItem>
 </file>
 
-<file path=customXml/item3.xml><?xml version="1.0" encoding="utf-8"?>
-<p:properties xmlns:p="http://schemas.microsoft.com/office/2006/metadata/properties" xmlns:xsi="http://www.w3.org/2001/XMLSchema-instance" xmlns:pc="http://schemas.microsoft.com/office/infopath/2007/PartnerControls">
-  <documentManagement/>
-</p:properties>
+<file path=customXml/itemProps2.xml><?xml version="1.0" encoding="utf-8"?>
+<ds:datastoreItem xmlns:ds="http://schemas.openxmlformats.org/officeDocument/2006/customXml" ds:itemID="{48CED005-3FFA-4649-9068-CF83EC1D0129}">
+  <ds:schemaRefs>
+    <ds:schemaRef ds:uri="http://schemas.microsoft.com/sharepoint/v3/contenttype/forms"/>
+  </ds:schemaRefs>
+</ds:datastoreItem>
 </file>
 
-<file path=customXml/itemProps1.xml><?xml version="1.0" encoding="utf-8"?>
+<file path=customXml/itemProps3.xml><?xml version="1.0" encoding="utf-8"?>
 <ds:datastoreItem xmlns:ds="http://schemas.openxmlformats.org/officeDocument/2006/customXml" ds:itemID="{719360C5-A938-4662-BE2A-FF924F9FF1AF}">
   <ds:schemaRefs>
     <ds:schemaRef ds:uri="http://schemas.microsoft.com/office/2006/metadata/contentType"/>
@@ -6640,21 +6696,4 @@
     <ds:schemaRef ds:uri="http://schemas.microsoft.com/internal/obd"/>
   </ds:schemaRefs>
 </ds:datastoreItem>
-</file>
-
-<file path=customXml/itemProps2.xml><?xml version="1.0" encoding="utf-8"?>
-<ds:datastoreItem xmlns:ds="http://schemas.openxmlformats.org/officeDocument/2006/customXml" ds:itemID="{48CED005-3FFA-4649-9068-CF83EC1D0129}">
-  <ds:schemaRefs>
-    <ds:schemaRef ds:uri="http://schemas.microsoft.com/sharepoint/v3/contenttype/forms"/>
-  </ds:schemaRefs>
-</ds:datastoreItem>
-</file>
-
-<file path=customXml/itemProps3.xml><?xml version="1.0" encoding="utf-8"?>
-<ds:datastoreItem xmlns:ds="http://schemas.openxmlformats.org/officeDocument/2006/customXml" ds:itemID="{D2B0D86C-7124-40CF-ACDD-DDA5B87CBC74}">
-  <ds:schemaRefs>
-    <ds:schemaRef ds:uri="http://schemas.microsoft.com/office/2006/metadata/properties"/>
-    <ds:schemaRef ds:uri="http://schemas.microsoft.com/office/infopath/2007/PartnerControls"/>
-  </ds:schemaRefs>
-</ds:datastoreItem>
 </file>
</xml_diff>